<commit_message>
template con colores correctos
</commit_message>
<xml_diff>
--- a/template.pptx
+++ b/template.pptx
@@ -5890,7 +5890,7 @@
               <a:avLst/>
             </a:prstGeom>
             <a:solidFill>
-              <a:srgbClr val="85A0FE"/>
+              <a:srgbClr val="FFD14C"/>
             </a:solidFill>
             <a:ln>
               <a:noFill/>
@@ -6006,7 +6006,7 @@
               <a:avLst/>
             </a:prstGeom>
             <a:solidFill>
-              <a:srgbClr val="FE938C"/>
+              <a:srgbClr val="FFD14C"/>
             </a:solidFill>
             <a:ln>
               <a:noFill/>
@@ -6577,7 +6577,7 @@
               <a:avLst/>
             </a:prstGeom>
             <a:solidFill>
-              <a:srgbClr val="85A0FE"/>
+              <a:srgbClr val="FFD14C"/>
             </a:solidFill>
             <a:ln>
               <a:noFill/>
@@ -6705,7 +6705,7 @@
               <a:avLst/>
             </a:prstGeom>
             <a:solidFill>
-              <a:srgbClr val="FE938C"/>
+              <a:srgbClr val="FFD14C"/>
             </a:solidFill>
             <a:ln>
               <a:noFill/>
@@ -7046,7 +7046,7 @@
               <a:avLst/>
             </a:prstGeom>
             <a:solidFill>
-              <a:srgbClr val="85A0FE"/>
+              <a:srgbClr val="FFD14C"/>
             </a:solidFill>
             <a:ln>
               <a:noFill/>
@@ -7174,7 +7174,7 @@
               <a:avLst/>
             </a:prstGeom>
             <a:solidFill>
-              <a:srgbClr val="FE938C"/>
+              <a:srgbClr val="FFD14C"/>
             </a:solidFill>
             <a:ln>
               <a:noFill/>
@@ -8077,7 +8077,7 @@
               <a:avLst/>
             </a:prstGeom>
             <a:solidFill>
-              <a:srgbClr val="85A0FE"/>
+              <a:srgbClr val="FFD14C"/>
             </a:solidFill>
             <a:ln>
               <a:noFill/>
@@ -8193,7 +8193,7 @@
               <a:avLst/>
             </a:prstGeom>
             <a:solidFill>
-              <a:srgbClr val="FE938C"/>
+              <a:srgbClr val="FFD14C"/>
             </a:solidFill>
             <a:ln>
               <a:noFill/>
@@ -9040,7 +9040,7 @@
               <a:avLst/>
             </a:prstGeom>
             <a:solidFill>
-              <a:srgbClr val="FE938C"/>
+              <a:srgbClr val="FFD14C"/>
             </a:solidFill>
             <a:ln>
               <a:noFill/>
@@ -9096,7 +9096,7 @@
               <a:avLst/>
             </a:prstGeom>
             <a:solidFill>
-              <a:srgbClr val="85A0FE"/>
+              <a:srgbClr val="FFD14C"/>
             </a:solidFill>
             <a:ln>
               <a:noFill/>

</xml_diff>